<commit_message>
Update 문서 06-17 145712 모델링 (영화, 리뷰).pptx
</commit_message>
<xml_diff>
--- a/ERD/문서 06-17 145712 모델링 (영화, 리뷰).pptx
+++ b/ERD/문서 06-17 145712 모델링 (영화, 리뷰).pptx
@@ -2,7 +2,7 @@
 <file path=ppt/presentation.xml><?xml version="1.0" encoding="utf-8"?>
 <p:presentation xmlns:a="http://schemas.openxmlformats.org/drawingml/2006/main" xmlns:r="http://schemas.openxmlformats.org/officeDocument/2006/relationships" xmlns:p="http://schemas.openxmlformats.org/presentationml/2006/main" xmlns:p14="http://schemas.microsoft.com/office/powerpoint/2010/main" saveSubsetFonts="1">
   <p:sldMasterIdLst>
-    <p:sldMasterId id="2147483669" r:id="rId13"/>
+    <p:sldMasterId id="2147483670" r:id="rId13"/>
   </p:sldMasterIdLst>
   <p:notesMasterIdLst>
     <p:notesMasterId r:id="rId17"/>
@@ -12,7 +12,7 @@
   </p:handoutMasterIdLst>
   <p:sldIdLst>
     <p:sldId id="256" r:id="rId19"/>
-    <p:sldId id="258" r:id="rId20"/>
+    <p:sldId id="258" r:id="rId21"/>
   </p:sldIdLst>
   <p:sldSz cx="12192000" cy="6858000"/>
   <p:notesSz cx="6858000" cy="9144000"/>
@@ -8628,7 +8628,7 @@
         <p:spPr>
           <a:xfrm>
             <a:off x="6743700" y="114300"/>
-            <a:ext cx="5011420" cy="1431290"/>
+            <a:ext cx="5012055" cy="1431290"/>
           </a:xfrm>
           <a:prstGeom prst="rect"/>
           <a:noFill/>
@@ -8683,7 +8683,21 @@
                 <a:latin typeface="맑은 고딕" charset="0"/>
                 <a:ea typeface="맑은 고딕" charset="0"/>
               </a:rPr>
-              <a:t>FK(게시물코드)</a:t>
+              <a:t>FK(</a:t>
+            </a:r>
+            <a:r>
+              <a:rPr lang="ko-KR" sz="1200" u="sng">
+                <a:latin typeface="맑은 고딕" charset="0"/>
+                <a:ea typeface="맑은 고딕" charset="0"/>
+              </a:rPr>
+              <a:t>회원코드</a:t>
+            </a:r>
+            <a:r>
+              <a:rPr lang="ko-KR" sz="1200" u="sng">
+                <a:latin typeface="맑은 고딕" charset="0"/>
+                <a:ea typeface="맑은 고딕" charset="0"/>
+              </a:rPr>
+              <a:t>)</a:t>
             </a:r>
             <a:r>
               <a:rPr lang="ko-KR" sz="1200">
@@ -8867,111 +8881,7 @@
                 <a:latin typeface="맑은 고딕" charset="0"/>
                 <a:ea typeface="맑은 고딕" charset="0"/>
               </a:rPr>
-              <a:t>*테이블</a:t>
-            </a:r>
-            <a:r>
-              <a:rPr lang="ko-KR" sz="1000">
-                <a:solidFill>
-                  <a:schemeClr val="tx1">
-                    <a:lumMod val="50000"/>
-                    <a:lumOff val="50000"/>
-                  </a:schemeClr>
-                </a:solidFill>
-                <a:latin typeface="맑은 고딕" charset="0"/>
-                <a:ea typeface="맑은 고딕" charset="0"/>
-              </a:rPr>
-              <a:t> </a:t>
-            </a:r>
-            <a:r>
-              <a:rPr lang="ko-KR" sz="1000">
-                <a:solidFill>
-                  <a:schemeClr val="tx1">
-                    <a:lumMod val="50000"/>
-                    <a:lumOff val="50000"/>
-                  </a:schemeClr>
-                </a:solidFill>
-                <a:latin typeface="맑은 고딕" charset="0"/>
-                <a:ea typeface="맑은 고딕" charset="0"/>
-              </a:rPr>
-              <a:t>만드는</a:t>
-            </a:r>
-            <a:r>
-              <a:rPr lang="ko-KR" sz="1000">
-                <a:solidFill>
-                  <a:schemeClr val="tx1">
-                    <a:lumMod val="50000"/>
-                    <a:lumOff val="50000"/>
-                  </a:schemeClr>
-                </a:solidFill>
-                <a:latin typeface="맑은 고딕" charset="0"/>
-                <a:ea typeface="맑은 고딕" charset="0"/>
-              </a:rPr>
-              <a:t> </a:t>
-            </a:r>
-            <a:r>
-              <a:rPr lang="ko-KR" sz="1000">
-                <a:solidFill>
-                  <a:schemeClr val="tx1">
-                    <a:lumMod val="50000"/>
-                    <a:lumOff val="50000"/>
-                  </a:schemeClr>
-                </a:solidFill>
-                <a:latin typeface="맑은 고딕" charset="0"/>
-                <a:ea typeface="맑은 고딕" charset="0"/>
-              </a:rPr>
-              <a:t>순서</a:t>
-            </a:r>
-            <a:r>
-              <a:rPr lang="ko-KR" sz="1000">
-                <a:solidFill>
-                  <a:schemeClr val="tx1">
-                    <a:lumMod val="50000"/>
-                    <a:lumOff val="50000"/>
-                  </a:schemeClr>
-                </a:solidFill>
-                <a:latin typeface="맑은 고딕" charset="0"/>
-                <a:ea typeface="맑은 고딕" charset="0"/>
-              </a:rPr>
-              <a:t> </a:t>
-            </a:r>
-            <a:r>
-              <a:rPr lang="ko-KR" sz="1000">
-                <a:solidFill>
-                  <a:schemeClr val="tx1">
-                    <a:lumMod val="50000"/>
-                    <a:lumOff val="50000"/>
-                  </a:schemeClr>
-                </a:solidFill>
-                <a:latin typeface="맑은 고딕" charset="0"/>
-                <a:ea typeface="맑은 고딕" charset="0"/>
-              </a:rPr>
-              <a:t>:</a:t>
-            </a:r>
-            <a:r>
-              <a:rPr lang="ko-KR" sz="1000">
-                <a:solidFill>
-                  <a:schemeClr val="tx1">
-                    <a:lumMod val="50000"/>
-                    <a:lumOff val="50000"/>
-                  </a:schemeClr>
-                </a:solidFill>
-                <a:latin typeface="맑은 고딕" charset="0"/>
-                <a:ea typeface="맑은 고딕" charset="0"/>
-              </a:rPr>
-              <a:t> </a:t>
-            </a:r>
-            <a:r>
-              <a:rPr lang="ko-KR" sz="1000">
-                <a:solidFill>
-                  <a:schemeClr val="tx1">
-                    <a:lumMod val="50000"/>
-                    <a:lumOff val="50000"/>
-                  </a:schemeClr>
-                </a:solidFill>
-                <a:latin typeface="맑은 고딕" charset="0"/>
-                <a:ea typeface="맑은 고딕" charset="0"/>
-              </a:rPr>
-              <a:t>회원&gt;게시판&gt;첨부파일&gt;댓글</a:t>
+              <a:t>*테이블 만드는 순서 : 회원&gt;게시판&gt;첨부파일&gt;댓글</a:t>
             </a:r>
             <a:endParaRPr lang="ko-KR" altLang="en-US" sz="1000">
               <a:solidFill>

</xml_diff>